<commit_message>
finished L8.1 and L8.2
</commit_message>
<xml_diff>
--- a/Slides/Lesson 8.1 General Recursion.pptx
+++ b/Slides/Lesson 8.1 General Recursion.pptx
@@ -5477,7 +5477,7 @@
             <a:fld id="{CF8F25F6-E1EF-4065-8525-42EDEBD9BD22}" type="datetimeFigureOut">
               <a:rPr lang="en-US" smtClean="0"/>
               <a:pPr/>
-              <a:t>10/13/2017</a:t>
+              <a:t>10/22/2017</a:t>
             </a:fld>
             <a:endParaRPr lang="en-US"/>
           </a:p>
@@ -6701,7 +6701,7 @@
           <a:p>
             <a:fld id="{2F1F79F5-7BEC-496A-AFC7-876E38F64D71}" type="datetime1">
               <a:rPr lang="en-US" smtClean="0"/>
-              <a:t>10/13/2017</a:t>
+              <a:t>10/22/2017</a:t>
             </a:fld>
             <a:endParaRPr lang="en-US"/>
           </a:p>
@@ -6796,7 +6796,7 @@
           <a:p>
             <a:fld id="{0A05703A-7669-4FEA-9056-25299B4D29D4}" type="datetime1">
               <a:rPr lang="en-US" smtClean="0"/>
-              <a:t>10/13/2017</a:t>
+              <a:t>10/22/2017</a:t>
             </a:fld>
             <a:endParaRPr lang="en-US"/>
           </a:p>
@@ -7071,7 +7071,7 @@
           <a:p>
             <a:fld id="{6E5077B5-BB57-49DB-88CA-226A139E5C01}" type="datetime1">
               <a:rPr lang="en-US" smtClean="0"/>
-              <a:t>10/13/2017</a:t>
+              <a:t>10/22/2017</a:t>
             </a:fld>
             <a:endParaRPr lang="en-US"/>
           </a:p>
@@ -7323,7 +7323,7 @@
           <a:p>
             <a:fld id="{C48D9447-CBD6-49A1-89FD-8512A8CF8999}" type="datetime1">
               <a:rPr lang="en-US" smtClean="0"/>
-              <a:t>10/13/2017</a:t>
+              <a:t>10/22/2017</a:t>
             </a:fld>
             <a:endParaRPr lang="en-US"/>
           </a:p>
@@ -7491,7 +7491,7 @@
           <a:p>
             <a:fld id="{A3639A2A-823D-48B7-9ACE-7FAF42870BA9}" type="datetime1">
               <a:rPr lang="en-US" smtClean="0"/>
-              <a:t>10/13/2017</a:t>
+              <a:t>10/22/2017</a:t>
             </a:fld>
             <a:endParaRPr lang="en-US"/>
           </a:p>
@@ -7669,7 +7669,7 @@
           <a:p>
             <a:fld id="{ED1B6996-82E9-463C-972C-7B56056E426C}" type="datetime1">
               <a:rPr lang="en-US" smtClean="0"/>
-              <a:t>10/13/2017</a:t>
+              <a:t>10/22/2017</a:t>
             </a:fld>
             <a:endParaRPr lang="en-US"/>
           </a:p>
@@ -7843,7 +7843,7 @@
           <a:p>
             <a:fld id="{E22ED4DA-448D-4BB1-B935-CC112220207B}" type="datetime1">
               <a:rPr lang="en-US" smtClean="0"/>
-              <a:t>10/13/2017</a:t>
+              <a:t>10/22/2017</a:t>
             </a:fld>
             <a:endParaRPr lang="en-US"/>
           </a:p>
@@ -8016,7 +8016,7 @@
           <a:p>
             <a:fld id="{E22ED4DA-448D-4BB1-B935-CC112220207B}" type="datetime1">
               <a:rPr lang="en-US" smtClean="0"/>
-              <a:t>10/13/2017</a:t>
+              <a:t>10/22/2017</a:t>
             </a:fld>
             <a:endParaRPr lang="en-US"/>
           </a:p>
@@ -8276,7 +8276,7 @@
           <a:p>
             <a:fld id="{FF5D65A6-AB94-4435-B0B7-3743215FA46C}" type="datetime1">
               <a:rPr lang="en-US" smtClean="0"/>
-              <a:t>10/13/2017</a:t>
+              <a:t>10/22/2017</a:t>
             </a:fld>
             <a:endParaRPr lang="en-US"/>
           </a:p>
@@ -8452,7 +8452,7 @@
           <a:p>
             <a:fld id="{FF5D65A6-AB94-4435-B0B7-3743215FA46C}" type="datetime1">
               <a:rPr lang="en-US" smtClean="0"/>
-              <a:t>10/13/2017</a:t>
+              <a:t>10/22/2017</a:t>
             </a:fld>
             <a:endParaRPr lang="en-US"/>
           </a:p>
@@ -8746,7 +8746,7 @@
           <a:p>
             <a:fld id="{7C193DC4-6EF0-48C9-B29C-616106A645E1}" type="datetime1">
               <a:rPr lang="en-US" smtClean="0"/>
-              <a:t>10/13/2017</a:t>
+              <a:t>10/22/2017</a:t>
             </a:fld>
             <a:endParaRPr lang="en-US"/>
           </a:p>
@@ -9031,7 +9031,7 @@
           <a:p>
             <a:fld id="{5D1846AD-9252-4647-9435-4C2AC365653A}" type="datetime1">
               <a:rPr lang="en-US" smtClean="0"/>
-              <a:t>10/13/2017</a:t>
+              <a:t>10/22/2017</a:t>
             </a:fld>
             <a:endParaRPr lang="en-US"/>
           </a:p>
@@ -9450,7 +9450,7 @@
           <a:p>
             <a:fld id="{CE56DC10-3561-4063-A6AF-C1CC7A41040A}" type="datetime1">
               <a:rPr lang="en-US" smtClean="0"/>
-              <a:t>10/13/2017</a:t>
+              <a:t>10/22/2017</a:t>
             </a:fld>
             <a:endParaRPr lang="en-US"/>
           </a:p>
@@ -9567,7 +9567,7 @@
           <a:p>
             <a:fld id="{2F7B77F5-1464-4F6B-92A8-64FC8A508293}" type="datetime1">
               <a:rPr lang="en-US" smtClean="0"/>
-              <a:t>10/13/2017</a:t>
+              <a:t>10/22/2017</a:t>
             </a:fld>
             <a:endParaRPr lang="en-US"/>
           </a:p>
@@ -9790,7 +9790,7 @@
           <a:p>
             <a:fld id="{02B3F677-983B-48DB-ADFD-63FE6CBC7FB2}" type="datetime1">
               <a:rPr lang="en-US" smtClean="0"/>
-              <a:t>10/13/2017</a:t>
+              <a:t>10/22/2017</a:t>
             </a:fld>
             <a:endParaRPr lang="en-US"/>
           </a:p>
@@ -17297,21 +17297,13 @@
           <a:p>
             <a:r>
               <a:rPr lang="en-US" dirty="0"/>
-              <a:t>Study the files </a:t>
-            </a:r>
-            <a:r>
-              <a:rPr lang="en-US"/>
-              <a:t>08-1-decode.rkt and 08-2-merge-sort.rkt in </a:t>
-            </a:r>
-            <a:r>
-              <a:rPr lang="en-US" dirty="0"/>
-              <a:t>the Examples folder.</a:t>
-            </a:r>
-          </a:p>
-          <a:p>
-            <a:r>
-              <a:rPr lang="en-US" dirty="0"/>
-              <a:t>Do Guided Practice 8.1</a:t>
+              <a:t>Study the files 08-1-decode.rkt and 08-2-merge-sort.rkt in the Examples folder.</a:t>
+            </a:r>
+          </a:p>
+          <a:p>
+            <a:r>
+              <a:rPr lang="en-US" dirty="0"/>
+              <a:t>Do Guided Practices 8.1 and 8.2</a:t>
             </a:r>
           </a:p>
           <a:p>

</xml_diff>

<commit_message>
removed reference to 08-1-decode.rkt in L8.1
</commit_message>
<xml_diff>
--- a/Slides/Lesson 8.1 General Recursion.pptx
+++ b/Slides/Lesson 8.1 General Recursion.pptx
@@ -5477,7 +5477,7 @@
             <a:fld id="{CF8F25F6-E1EF-4065-8525-42EDEBD9BD22}" type="datetimeFigureOut">
               <a:rPr lang="en-US" smtClean="0"/>
               <a:pPr/>
-              <a:t>10/22/2017</a:t>
+              <a:t>10/30/2017</a:t>
             </a:fld>
             <a:endParaRPr lang="en-US"/>
           </a:p>
@@ -6701,7 +6701,7 @@
           <a:p>
             <a:fld id="{2F1F79F5-7BEC-496A-AFC7-876E38F64D71}" type="datetime1">
               <a:rPr lang="en-US" smtClean="0"/>
-              <a:t>10/22/2017</a:t>
+              <a:t>10/30/2017</a:t>
             </a:fld>
             <a:endParaRPr lang="en-US"/>
           </a:p>
@@ -6796,7 +6796,7 @@
           <a:p>
             <a:fld id="{0A05703A-7669-4FEA-9056-25299B4D29D4}" type="datetime1">
               <a:rPr lang="en-US" smtClean="0"/>
-              <a:t>10/22/2017</a:t>
+              <a:t>10/30/2017</a:t>
             </a:fld>
             <a:endParaRPr lang="en-US"/>
           </a:p>
@@ -7071,7 +7071,7 @@
           <a:p>
             <a:fld id="{6E5077B5-BB57-49DB-88CA-226A139E5C01}" type="datetime1">
               <a:rPr lang="en-US" smtClean="0"/>
-              <a:t>10/22/2017</a:t>
+              <a:t>10/30/2017</a:t>
             </a:fld>
             <a:endParaRPr lang="en-US"/>
           </a:p>
@@ -7323,7 +7323,7 @@
           <a:p>
             <a:fld id="{C48D9447-CBD6-49A1-89FD-8512A8CF8999}" type="datetime1">
               <a:rPr lang="en-US" smtClean="0"/>
-              <a:t>10/22/2017</a:t>
+              <a:t>10/30/2017</a:t>
             </a:fld>
             <a:endParaRPr lang="en-US"/>
           </a:p>
@@ -7491,7 +7491,7 @@
           <a:p>
             <a:fld id="{A3639A2A-823D-48B7-9ACE-7FAF42870BA9}" type="datetime1">
               <a:rPr lang="en-US" smtClean="0"/>
-              <a:t>10/22/2017</a:t>
+              <a:t>10/30/2017</a:t>
             </a:fld>
             <a:endParaRPr lang="en-US"/>
           </a:p>
@@ -7669,7 +7669,7 @@
           <a:p>
             <a:fld id="{ED1B6996-82E9-463C-972C-7B56056E426C}" type="datetime1">
               <a:rPr lang="en-US" smtClean="0"/>
-              <a:t>10/22/2017</a:t>
+              <a:t>10/30/2017</a:t>
             </a:fld>
             <a:endParaRPr lang="en-US"/>
           </a:p>
@@ -7843,7 +7843,7 @@
           <a:p>
             <a:fld id="{E22ED4DA-448D-4BB1-B935-CC112220207B}" type="datetime1">
               <a:rPr lang="en-US" smtClean="0"/>
-              <a:t>10/22/2017</a:t>
+              <a:t>10/30/2017</a:t>
             </a:fld>
             <a:endParaRPr lang="en-US"/>
           </a:p>
@@ -8016,7 +8016,7 @@
           <a:p>
             <a:fld id="{E22ED4DA-448D-4BB1-B935-CC112220207B}" type="datetime1">
               <a:rPr lang="en-US" smtClean="0"/>
-              <a:t>10/22/2017</a:t>
+              <a:t>10/30/2017</a:t>
             </a:fld>
             <a:endParaRPr lang="en-US"/>
           </a:p>
@@ -8276,7 +8276,7 @@
           <a:p>
             <a:fld id="{FF5D65A6-AB94-4435-B0B7-3743215FA46C}" type="datetime1">
               <a:rPr lang="en-US" smtClean="0"/>
-              <a:t>10/22/2017</a:t>
+              <a:t>10/30/2017</a:t>
             </a:fld>
             <a:endParaRPr lang="en-US"/>
           </a:p>
@@ -8452,7 +8452,7 @@
           <a:p>
             <a:fld id="{FF5D65A6-AB94-4435-B0B7-3743215FA46C}" type="datetime1">
               <a:rPr lang="en-US" smtClean="0"/>
-              <a:t>10/22/2017</a:t>
+              <a:t>10/30/2017</a:t>
             </a:fld>
             <a:endParaRPr lang="en-US"/>
           </a:p>
@@ -8746,7 +8746,7 @@
           <a:p>
             <a:fld id="{7C193DC4-6EF0-48C9-B29C-616106A645E1}" type="datetime1">
               <a:rPr lang="en-US" smtClean="0"/>
-              <a:t>10/22/2017</a:t>
+              <a:t>10/30/2017</a:t>
             </a:fld>
             <a:endParaRPr lang="en-US"/>
           </a:p>
@@ -9031,7 +9031,7 @@
           <a:p>
             <a:fld id="{5D1846AD-9252-4647-9435-4C2AC365653A}" type="datetime1">
               <a:rPr lang="en-US" smtClean="0"/>
-              <a:t>10/22/2017</a:t>
+              <a:t>10/30/2017</a:t>
             </a:fld>
             <a:endParaRPr lang="en-US"/>
           </a:p>
@@ -9450,7 +9450,7 @@
           <a:p>
             <a:fld id="{CE56DC10-3561-4063-A6AF-C1CC7A41040A}" type="datetime1">
               <a:rPr lang="en-US" smtClean="0"/>
-              <a:t>10/22/2017</a:t>
+              <a:t>10/30/2017</a:t>
             </a:fld>
             <a:endParaRPr lang="en-US"/>
           </a:p>
@@ -9567,7 +9567,7 @@
           <a:p>
             <a:fld id="{2F7B77F5-1464-4F6B-92A8-64FC8A508293}" type="datetime1">
               <a:rPr lang="en-US" smtClean="0"/>
-              <a:t>10/22/2017</a:t>
+              <a:t>10/30/2017</a:t>
             </a:fld>
             <a:endParaRPr lang="en-US"/>
           </a:p>
@@ -9790,7 +9790,7 @@
           <a:p>
             <a:fld id="{02B3F677-983B-48DB-ADFD-63FE6CBC7FB2}" type="datetime1">
               <a:rPr lang="en-US" smtClean="0"/>
-              <a:t>10/22/2017</a:t>
+              <a:t>10/30/2017</a:t>
             </a:fld>
             <a:endParaRPr lang="en-US"/>
           </a:p>
@@ -17297,7 +17297,15 @@
           <a:p>
             <a:r>
               <a:rPr lang="en-US" dirty="0"/>
-              <a:t>Study the files 08-1-decode.rkt and 08-2-merge-sort.rkt in the Examples folder.</a:t>
+              <a:t>Study the </a:t>
+            </a:r>
+            <a:r>
+              <a:rPr lang="en-US"/>
+              <a:t>files 08-1-merge-sort</a:t>
+            </a:r>
+            <a:r>
+              <a:rPr lang="en-US" dirty="0"/>
+              <a:t>.rkt in the Examples folder.</a:t>
             </a:r>
           </a:p>
           <a:p>

</xml_diff>

<commit_message>
fixed assorted typos, updated syllabus
</commit_message>
<xml_diff>
--- a/Slides/Lesson 8.1 General Recursion.pptx
+++ b/Slides/Lesson 8.1 General Recursion.pptx
@@ -5477,7 +5477,7 @@
             <a:fld id="{CF8F25F6-E1EF-4065-8525-42EDEBD9BD22}" type="datetimeFigureOut">
               <a:rPr lang="en-US" smtClean="0"/>
               <a:pPr/>
-              <a:t>10/30/2017</a:t>
+              <a:t>11/1/2017</a:t>
             </a:fld>
             <a:endParaRPr lang="en-US"/>
           </a:p>
@@ -6701,7 +6701,7 @@
           <a:p>
             <a:fld id="{2F1F79F5-7BEC-496A-AFC7-876E38F64D71}" type="datetime1">
               <a:rPr lang="en-US" smtClean="0"/>
-              <a:t>10/30/2017</a:t>
+              <a:t>11/1/2017</a:t>
             </a:fld>
             <a:endParaRPr lang="en-US"/>
           </a:p>
@@ -6796,7 +6796,7 @@
           <a:p>
             <a:fld id="{0A05703A-7669-4FEA-9056-25299B4D29D4}" type="datetime1">
               <a:rPr lang="en-US" smtClean="0"/>
-              <a:t>10/30/2017</a:t>
+              <a:t>11/1/2017</a:t>
             </a:fld>
             <a:endParaRPr lang="en-US"/>
           </a:p>
@@ -7071,7 +7071,7 @@
           <a:p>
             <a:fld id="{6E5077B5-BB57-49DB-88CA-226A139E5C01}" type="datetime1">
               <a:rPr lang="en-US" smtClean="0"/>
-              <a:t>10/30/2017</a:t>
+              <a:t>11/1/2017</a:t>
             </a:fld>
             <a:endParaRPr lang="en-US"/>
           </a:p>
@@ -7323,7 +7323,7 @@
           <a:p>
             <a:fld id="{C48D9447-CBD6-49A1-89FD-8512A8CF8999}" type="datetime1">
               <a:rPr lang="en-US" smtClean="0"/>
-              <a:t>10/30/2017</a:t>
+              <a:t>11/1/2017</a:t>
             </a:fld>
             <a:endParaRPr lang="en-US"/>
           </a:p>
@@ -7491,7 +7491,7 @@
           <a:p>
             <a:fld id="{A3639A2A-823D-48B7-9ACE-7FAF42870BA9}" type="datetime1">
               <a:rPr lang="en-US" smtClean="0"/>
-              <a:t>10/30/2017</a:t>
+              <a:t>11/1/2017</a:t>
             </a:fld>
             <a:endParaRPr lang="en-US"/>
           </a:p>
@@ -7669,7 +7669,7 @@
           <a:p>
             <a:fld id="{ED1B6996-82E9-463C-972C-7B56056E426C}" type="datetime1">
               <a:rPr lang="en-US" smtClean="0"/>
-              <a:t>10/30/2017</a:t>
+              <a:t>11/1/2017</a:t>
             </a:fld>
             <a:endParaRPr lang="en-US"/>
           </a:p>
@@ -7843,7 +7843,7 @@
           <a:p>
             <a:fld id="{E22ED4DA-448D-4BB1-B935-CC112220207B}" type="datetime1">
               <a:rPr lang="en-US" smtClean="0"/>
-              <a:t>10/30/2017</a:t>
+              <a:t>11/1/2017</a:t>
             </a:fld>
             <a:endParaRPr lang="en-US"/>
           </a:p>
@@ -8016,7 +8016,7 @@
           <a:p>
             <a:fld id="{E22ED4DA-448D-4BB1-B935-CC112220207B}" type="datetime1">
               <a:rPr lang="en-US" smtClean="0"/>
-              <a:t>10/30/2017</a:t>
+              <a:t>11/1/2017</a:t>
             </a:fld>
             <a:endParaRPr lang="en-US"/>
           </a:p>
@@ -8276,7 +8276,7 @@
           <a:p>
             <a:fld id="{FF5D65A6-AB94-4435-B0B7-3743215FA46C}" type="datetime1">
               <a:rPr lang="en-US" smtClean="0"/>
-              <a:t>10/30/2017</a:t>
+              <a:t>11/1/2017</a:t>
             </a:fld>
             <a:endParaRPr lang="en-US"/>
           </a:p>
@@ -8452,7 +8452,7 @@
           <a:p>
             <a:fld id="{FF5D65A6-AB94-4435-B0B7-3743215FA46C}" type="datetime1">
               <a:rPr lang="en-US" smtClean="0"/>
-              <a:t>10/30/2017</a:t>
+              <a:t>11/1/2017</a:t>
             </a:fld>
             <a:endParaRPr lang="en-US"/>
           </a:p>
@@ -8746,7 +8746,7 @@
           <a:p>
             <a:fld id="{7C193DC4-6EF0-48C9-B29C-616106A645E1}" type="datetime1">
               <a:rPr lang="en-US" smtClean="0"/>
-              <a:t>10/30/2017</a:t>
+              <a:t>11/1/2017</a:t>
             </a:fld>
             <a:endParaRPr lang="en-US"/>
           </a:p>
@@ -9031,7 +9031,7 @@
           <a:p>
             <a:fld id="{5D1846AD-9252-4647-9435-4C2AC365653A}" type="datetime1">
               <a:rPr lang="en-US" smtClean="0"/>
-              <a:t>10/30/2017</a:t>
+              <a:t>11/1/2017</a:t>
             </a:fld>
             <a:endParaRPr lang="en-US"/>
           </a:p>
@@ -9450,7 +9450,7 @@
           <a:p>
             <a:fld id="{CE56DC10-3561-4063-A6AF-C1CC7A41040A}" type="datetime1">
               <a:rPr lang="en-US" smtClean="0"/>
-              <a:t>10/30/2017</a:t>
+              <a:t>11/1/2017</a:t>
             </a:fld>
             <a:endParaRPr lang="en-US"/>
           </a:p>
@@ -9567,7 +9567,7 @@
           <a:p>
             <a:fld id="{2F7B77F5-1464-4F6B-92A8-64FC8A508293}" type="datetime1">
               <a:rPr lang="en-US" smtClean="0"/>
-              <a:t>10/30/2017</a:t>
+              <a:t>11/1/2017</a:t>
             </a:fld>
             <a:endParaRPr lang="en-US"/>
           </a:p>
@@ -9790,7 +9790,7 @@
           <a:p>
             <a:fld id="{02B3F677-983B-48DB-ADFD-63FE6CBC7FB2}" type="datetime1">
               <a:rPr lang="en-US" smtClean="0"/>
-              <a:t>10/30/2017</a:t>
+              <a:t>11/1/2017</a:t>
             </a:fld>
             <a:endParaRPr lang="en-US"/>
           </a:p>
@@ -17519,7 +17519,7 @@
           <a:p>
             <a:r>
               <a:rPr lang="en-US" dirty="0"/>
-              <a:t>So far, we've written our functions using the destructor template to recur on the sub-pieces of the data.  We sometimes call this </a:t>
+              <a:t>So far, we've written our functions using the observer template to recur on the sub-pieces of the data.  We sometimes call this </a:t>
             </a:r>
             <a:r>
               <a:rPr lang="en-US" i="1" dirty="0">

</xml_diff>